<commit_message>
update project day 02
</commit_message>
<xml_diff>
--- a/Day-01/BCA_FINANCE_DAY_01.pptx
+++ b/Day-01/BCA_FINANCE_DAY_01.pptx
@@ -5,10 +5,10 @@
     <p:sldMasterId id="2147483657" r:id="rId1"/>
   </p:sldMasterIdLst>
   <p:notesMasterIdLst>
-    <p:notesMasterId r:id="rId37"/>
+    <p:notesMasterId r:id="rId40"/>
   </p:notesMasterIdLst>
   <p:handoutMasterIdLst>
-    <p:handoutMasterId r:id="rId38"/>
+    <p:handoutMasterId r:id="rId41"/>
   </p:handoutMasterIdLst>
   <p:sldIdLst>
     <p:sldId id="256" r:id="rId2"/>
@@ -44,32 +44,35 @@
     <p:sldId id="423" r:id="rId32"/>
     <p:sldId id="424" r:id="rId33"/>
     <p:sldId id="425" r:id="rId34"/>
-    <p:sldId id="337" r:id="rId35"/>
-    <p:sldId id="336" r:id="rId36"/>
+    <p:sldId id="426" r:id="rId35"/>
+    <p:sldId id="427" r:id="rId36"/>
+    <p:sldId id="428" r:id="rId37"/>
+    <p:sldId id="337" r:id="rId38"/>
+    <p:sldId id="336" r:id="rId39"/>
   </p:sldIdLst>
   <p:sldSz cx="9144000" cy="5143500" type="screen16x9"/>
   <p:notesSz cx="6858000" cy="9144000"/>
   <p:embeddedFontLst>
     <p:embeddedFont>
       <p:font typeface="Arvo" panose="020B0604020202020204" charset="0"/>
-      <p:regular r:id="rId39"/>
-      <p:bold r:id="rId40"/>
-      <p:italic r:id="rId41"/>
-      <p:boldItalic r:id="rId42"/>
+      <p:regular r:id="rId42"/>
+      <p:bold r:id="rId43"/>
+      <p:italic r:id="rId44"/>
+      <p:boldItalic r:id="rId45"/>
     </p:embeddedFont>
     <p:embeddedFont>
       <p:font typeface="Roboto Condensed" panose="020B0604020202020204" charset="0"/>
-      <p:regular r:id="rId43"/>
-      <p:bold r:id="rId44"/>
-      <p:italic r:id="rId45"/>
-      <p:boldItalic r:id="rId46"/>
+      <p:regular r:id="rId46"/>
+      <p:bold r:id="rId47"/>
+      <p:italic r:id="rId48"/>
+      <p:boldItalic r:id="rId49"/>
     </p:embeddedFont>
     <p:embeddedFont>
       <p:font typeface="Roboto Condensed Light" panose="020B0604020202020204" charset="0"/>
-      <p:regular r:id="rId47"/>
-      <p:bold r:id="rId48"/>
-      <p:italic r:id="rId49"/>
-      <p:boldItalic r:id="rId50"/>
+      <p:regular r:id="rId50"/>
+      <p:bold r:id="rId51"/>
+      <p:italic r:id="rId52"/>
+      <p:boldItalic r:id="rId53"/>
     </p:embeddedFont>
   </p:embeddedFontLst>
   <p:defaultTextStyle>
@@ -355,6 +358,9 @@
           <p14:sldIdLst>
             <p14:sldId id="424"/>
             <p14:sldId id="425"/>
+            <p14:sldId id="426"/>
+            <p14:sldId id="427"/>
+            <p14:sldId id="428"/>
             <p14:sldId id="337"/>
             <p14:sldId id="336"/>
           </p14:sldIdLst>
@@ -476,7 +482,7 @@
           <a:p>
             <a:fld id="{4733E266-81C0-45AD-882E-DCDF1EA89100}" type="datetimeFigureOut">
               <a:rPr lang="en-ID" smtClean="0"/>
-              <a:t>24/06/2019</a:t>
+              <a:t>25/06/2019</a:t>
             </a:fld>
             <a:endParaRPr lang="en-ID"/>
           </a:p>
@@ -18149,6 +18155,605 @@
       </p:grpSpPr>
       <p:sp>
         <p:nvSpPr>
+          <p:cNvPr id="2" name="Title 1">
+            <a:extLst>
+              <a:ext uri="{FF2B5EF4-FFF2-40B4-BE49-F238E27FC236}">
+                <a16:creationId xmlns:a16="http://schemas.microsoft.com/office/drawing/2014/main" id="{E1C4B97A-B25F-41FC-AB69-42B4BFB8A996}"/>
+              </a:ext>
+            </a:extLst>
+          </p:cNvPr>
+          <p:cNvSpPr>
+            <a:spLocks noGrp="1"/>
+          </p:cNvSpPr>
+          <p:nvPr>
+            <p:ph type="ctrTitle"/>
+          </p:nvPr>
+        </p:nvSpPr>
+        <p:spPr/>
+        <p:txBody>
+          <a:bodyPr/>
+          <a:lstStyle/>
+          <a:p>
+            <a:r>
+              <a:rPr lang="en-US" dirty="0"/>
+              <a:t>Day 01</a:t>
+            </a:r>
+            <a:endParaRPr lang="en-ID" dirty="0"/>
+          </a:p>
+        </p:txBody>
+      </p:sp>
+      <p:sp>
+        <p:nvSpPr>
+          <p:cNvPr id="3" name="Subtitle 2">
+            <a:extLst>
+              <a:ext uri="{FF2B5EF4-FFF2-40B4-BE49-F238E27FC236}">
+                <a16:creationId xmlns:a16="http://schemas.microsoft.com/office/drawing/2014/main" id="{B2DE4C9C-75AD-4D02-B515-6766EA1A235B}"/>
+              </a:ext>
+            </a:extLst>
+          </p:cNvPr>
+          <p:cNvSpPr>
+            <a:spLocks noGrp="1"/>
+          </p:cNvSpPr>
+          <p:nvPr>
+            <p:ph type="subTitle" idx="1"/>
+          </p:nvPr>
+        </p:nvSpPr>
+        <p:spPr/>
+        <p:txBody>
+          <a:bodyPr/>
+          <a:lstStyle/>
+          <a:p>
+            <a:r>
+              <a:rPr lang="en-US" dirty="0"/>
+              <a:t>HTML Practice</a:t>
+            </a:r>
+            <a:endParaRPr lang="en-ID" dirty="0"/>
+          </a:p>
+        </p:txBody>
+      </p:sp>
+      <p:sp>
+        <p:nvSpPr>
+          <p:cNvPr id="4" name="Slide Number Placeholder 3">
+            <a:extLst>
+              <a:ext uri="{FF2B5EF4-FFF2-40B4-BE49-F238E27FC236}">
+                <a16:creationId xmlns:a16="http://schemas.microsoft.com/office/drawing/2014/main" id="{916DB1F4-E56E-40F8-BE83-A77BD1B29ED2}"/>
+              </a:ext>
+            </a:extLst>
+          </p:cNvPr>
+          <p:cNvSpPr>
+            <a:spLocks noGrp="1"/>
+          </p:cNvSpPr>
+          <p:nvPr>
+            <p:ph type="sldNum" idx="12"/>
+          </p:nvPr>
+        </p:nvSpPr>
+        <p:spPr/>
+        <p:txBody>
+          <a:bodyPr/>
+          <a:lstStyle/>
+          <a:p>
+            <a:pPr marL="0" lvl="0" indent="0" algn="r" rtl="0">
+              <a:spcBef>
+                <a:spcPts val="0"/>
+              </a:spcBef>
+              <a:spcAft>
+                <a:spcPts val="0"/>
+              </a:spcAft>
+              <a:buNone/>
+            </a:pPr>
+            <a:fld id="{00000000-1234-1234-1234-123412341234}" type="slidenum">
+              <a:rPr lang="en" smtClean="0"/>
+              <a:t>34</a:t>
+            </a:fld>
+            <a:endParaRPr lang="en"/>
+          </a:p>
+        </p:txBody>
+      </p:sp>
+      <p:sp>
+        <p:nvSpPr>
+          <p:cNvPr id="5" name="Google Shape;224;p14">
+            <a:extLst>
+              <a:ext uri="{FF2B5EF4-FFF2-40B4-BE49-F238E27FC236}">
+                <a16:creationId xmlns:a16="http://schemas.microsoft.com/office/drawing/2014/main" id="{5FDF6675-7522-494F-BFC9-DCE4FBB03259}"/>
+              </a:ext>
+            </a:extLst>
+          </p:cNvPr>
+          <p:cNvSpPr txBox="1"/>
+          <p:nvPr/>
+        </p:nvSpPr>
+        <p:spPr>
+          <a:xfrm>
+            <a:off x="463525" y="0"/>
+            <a:ext cx="2181600" cy="3136200"/>
+          </a:xfrm>
+          <a:prstGeom prst="rect">
+            <a:avLst/>
+          </a:prstGeom>
+          <a:noFill/>
+          <a:ln>
+            <a:noFill/>
+          </a:ln>
+        </p:spPr>
+        <p:txBody>
+          <a:bodyPr spcFirstLastPara="1" wrap="square" lIns="91425" tIns="91425" rIns="91425" bIns="91425" anchor="b" anchorCtr="0">
+            <a:noAutofit/>
+          </a:bodyPr>
+          <a:lstStyle/>
+          <a:p>
+            <a:pPr marL="0" lvl="0" indent="0" algn="l" rtl="0">
+              <a:spcBef>
+                <a:spcPts val="0"/>
+              </a:spcBef>
+              <a:spcAft>
+                <a:spcPts val="0"/>
+              </a:spcAft>
+              <a:buNone/>
+            </a:pPr>
+            <a:r>
+              <a:rPr lang="en" sz="12000" b="1" dirty="0">
+                <a:solidFill>
+                  <a:srgbClr val="3F5378"/>
+                </a:solidFill>
+                <a:latin typeface="Roboto Condensed"/>
+                <a:ea typeface="Roboto Condensed"/>
+                <a:cs typeface="Roboto Condensed"/>
+                <a:sym typeface="Roboto Condensed"/>
+              </a:rPr>
+              <a:t>5</a:t>
+            </a:r>
+            <a:endParaRPr sz="3000" b="1" dirty="0">
+              <a:solidFill>
+                <a:srgbClr val="3F5378"/>
+              </a:solidFill>
+              <a:latin typeface="Roboto Condensed"/>
+              <a:ea typeface="Roboto Condensed"/>
+              <a:cs typeface="Roboto Condensed"/>
+              <a:sym typeface="Roboto Condensed"/>
+            </a:endParaRPr>
+          </a:p>
+        </p:txBody>
+      </p:sp>
+    </p:spTree>
+    <p:extLst>
+      <p:ext uri="{BB962C8B-B14F-4D97-AF65-F5344CB8AC3E}">
+        <p14:creationId xmlns:p14="http://schemas.microsoft.com/office/powerpoint/2010/main" val="1668293308"/>
+      </p:ext>
+    </p:extLst>
+  </p:cSld>
+  <p:clrMapOvr>
+    <a:masterClrMapping/>
+  </p:clrMapOvr>
+</p:sld>
+</file>
+
+<file path=ppt/slides/slide35.xml><?xml version="1.0" encoding="utf-8"?>
+<p:sld xmlns:a="http://schemas.openxmlformats.org/drawingml/2006/main" xmlns:r="http://schemas.openxmlformats.org/officeDocument/2006/relationships" xmlns:p="http://schemas.openxmlformats.org/presentationml/2006/main">
+  <p:cSld>
+    <p:spTree>
+      <p:nvGrpSpPr>
+        <p:cNvPr id="1" name=""/>
+        <p:cNvGrpSpPr/>
+        <p:nvPr/>
+      </p:nvGrpSpPr>
+      <p:grpSpPr>
+        <a:xfrm>
+          <a:off x="0" y="0"/>
+          <a:ext cx="0" cy="0"/>
+          <a:chOff x="0" y="0"/>
+          <a:chExt cx="0" cy="0"/>
+        </a:xfrm>
+      </p:grpSpPr>
+      <p:sp>
+        <p:nvSpPr>
+          <p:cNvPr id="4" name="Slide Number Placeholder 3">
+            <a:extLst>
+              <a:ext uri="{FF2B5EF4-FFF2-40B4-BE49-F238E27FC236}">
+                <a16:creationId xmlns:a16="http://schemas.microsoft.com/office/drawing/2014/main" id="{F29AC3FE-EF2D-4FC7-A821-FFD07E769347}"/>
+              </a:ext>
+            </a:extLst>
+          </p:cNvPr>
+          <p:cNvSpPr>
+            <a:spLocks noGrp="1"/>
+          </p:cNvSpPr>
+          <p:nvPr>
+            <p:ph type="sldNum" idx="12"/>
+          </p:nvPr>
+        </p:nvSpPr>
+        <p:spPr/>
+        <p:txBody>
+          <a:bodyPr/>
+          <a:lstStyle/>
+          <a:p>
+            <a:pPr marL="0" lvl="0" indent="0" algn="r" rtl="0">
+              <a:spcBef>
+                <a:spcPts val="0"/>
+              </a:spcBef>
+              <a:spcAft>
+                <a:spcPts val="0"/>
+              </a:spcAft>
+              <a:buNone/>
+            </a:pPr>
+            <a:fld id="{00000000-1234-1234-1234-123412341234}" type="slidenum">
+              <a:rPr lang="en" smtClean="0"/>
+              <a:t>35</a:t>
+            </a:fld>
+            <a:endParaRPr lang="en"/>
+          </a:p>
+        </p:txBody>
+      </p:sp>
+      <p:sp>
+        <p:nvSpPr>
+          <p:cNvPr id="6" name="Text Placeholder 5">
+            <a:extLst>
+              <a:ext uri="{FF2B5EF4-FFF2-40B4-BE49-F238E27FC236}">
+                <a16:creationId xmlns:a16="http://schemas.microsoft.com/office/drawing/2014/main" id="{47146CF6-8886-40AB-891C-5DC0C34C4902}"/>
+              </a:ext>
+            </a:extLst>
+          </p:cNvPr>
+          <p:cNvSpPr>
+            <a:spLocks noGrp="1"/>
+          </p:cNvSpPr>
+          <p:nvPr>
+            <p:ph type="body" idx="1"/>
+          </p:nvPr>
+        </p:nvSpPr>
+        <p:spPr/>
+        <p:txBody>
+          <a:bodyPr/>
+          <a:lstStyle/>
+          <a:p>
+            <a:r>
+              <a:rPr lang="en-US" dirty="0"/>
+              <a:t>The </a:t>
+            </a:r>
+            <a:r>
+              <a:rPr lang="en-US" b="1" dirty="0"/>
+              <a:t>JSP request</a:t>
+            </a:r>
+            <a:r>
+              <a:rPr lang="en-US" dirty="0"/>
+              <a:t> is an implicit object of type </a:t>
+            </a:r>
+            <a:r>
+              <a:rPr lang="en-US" dirty="0" err="1"/>
+              <a:t>HttpServletRequest</a:t>
+            </a:r>
+            <a:r>
+              <a:rPr lang="en-US" dirty="0"/>
+              <a:t> i.e. created for each </a:t>
+            </a:r>
+            <a:r>
+              <a:rPr lang="en-US" dirty="0" err="1"/>
+              <a:t>jsp</a:t>
+            </a:r>
+            <a:r>
+              <a:rPr lang="en-US" dirty="0"/>
+              <a:t> request by the web container. It can be used to get request information such as parameter, header information, remote address, server name, server port, content type, character encoding etc.</a:t>
+            </a:r>
+          </a:p>
+          <a:p>
+            <a:r>
+              <a:rPr lang="en-US" dirty="0"/>
+              <a:t>It can also be used to set, get and remove attributes from the </a:t>
+            </a:r>
+            <a:r>
+              <a:rPr lang="en-US" dirty="0" err="1"/>
+              <a:t>jsp</a:t>
+            </a:r>
+            <a:r>
+              <a:rPr lang="en-US" dirty="0"/>
+              <a:t> request scope.</a:t>
+            </a:r>
+          </a:p>
+          <a:p>
+            <a:r>
+              <a:rPr lang="en-US" dirty="0"/>
+              <a:t>Let's see the simple example of request implicit object where we are printing the name of the user with welcome message.</a:t>
+            </a:r>
+          </a:p>
+        </p:txBody>
+      </p:sp>
+      <p:sp>
+        <p:nvSpPr>
+          <p:cNvPr id="7" name="Text Placeholder 6">
+            <a:extLst>
+              <a:ext uri="{FF2B5EF4-FFF2-40B4-BE49-F238E27FC236}">
+                <a16:creationId xmlns:a16="http://schemas.microsoft.com/office/drawing/2014/main" id="{B80BA04F-6D65-4A71-A85B-EEDF61CCA1DA}"/>
+              </a:ext>
+            </a:extLst>
+          </p:cNvPr>
+          <p:cNvSpPr>
+            <a:spLocks noGrp="1"/>
+          </p:cNvSpPr>
+          <p:nvPr>
+            <p:ph type="body" idx="13"/>
+          </p:nvPr>
+        </p:nvSpPr>
+        <p:spPr/>
+        <p:txBody>
+          <a:bodyPr/>
+          <a:lstStyle/>
+          <a:p>
+            <a:endParaRPr lang="en-ID" dirty="0"/>
+          </a:p>
+        </p:txBody>
+      </p:sp>
+      <p:sp>
+        <p:nvSpPr>
+          <p:cNvPr id="5" name="Title 4">
+            <a:extLst>
+              <a:ext uri="{FF2B5EF4-FFF2-40B4-BE49-F238E27FC236}">
+                <a16:creationId xmlns:a16="http://schemas.microsoft.com/office/drawing/2014/main" id="{E7E43DD8-DCB7-4BA2-81EB-F4C4B1569F30}"/>
+              </a:ext>
+            </a:extLst>
+          </p:cNvPr>
+          <p:cNvSpPr>
+            <a:spLocks noGrp="1"/>
+          </p:cNvSpPr>
+          <p:nvPr>
+            <p:ph type="title"/>
+          </p:nvPr>
+        </p:nvSpPr>
+        <p:spPr/>
+        <p:txBody>
+          <a:bodyPr/>
+          <a:lstStyle/>
+          <a:p>
+            <a:r>
+              <a:rPr lang="en-US" dirty="0"/>
+              <a:t>JSP request implicit object</a:t>
+            </a:r>
+            <a:endParaRPr lang="en-ID" dirty="0"/>
+          </a:p>
+        </p:txBody>
+      </p:sp>
+    </p:spTree>
+    <p:extLst>
+      <p:ext uri="{BB962C8B-B14F-4D97-AF65-F5344CB8AC3E}">
+        <p14:creationId xmlns:p14="http://schemas.microsoft.com/office/powerpoint/2010/main" val="1456928597"/>
+      </p:ext>
+    </p:extLst>
+  </p:cSld>
+  <p:clrMapOvr>
+    <a:masterClrMapping/>
+  </p:clrMapOvr>
+</p:sld>
+</file>
+
+<file path=ppt/slides/slide36.xml><?xml version="1.0" encoding="utf-8"?>
+<p:sld xmlns:a="http://schemas.openxmlformats.org/drawingml/2006/main" xmlns:r="http://schemas.openxmlformats.org/officeDocument/2006/relationships" xmlns:p="http://schemas.openxmlformats.org/presentationml/2006/main">
+  <p:cSld>
+    <p:spTree>
+      <p:nvGrpSpPr>
+        <p:cNvPr id="1" name=""/>
+        <p:cNvGrpSpPr/>
+        <p:nvPr/>
+      </p:nvGrpSpPr>
+      <p:grpSpPr>
+        <a:xfrm>
+          <a:off x="0" y="0"/>
+          <a:ext cx="0" cy="0"/>
+          <a:chOff x="0" y="0"/>
+          <a:chExt cx="0" cy="0"/>
+        </a:xfrm>
+      </p:grpSpPr>
+      <p:sp>
+        <p:nvSpPr>
+          <p:cNvPr id="2" name="Slide Number Placeholder 1">
+            <a:extLst>
+              <a:ext uri="{FF2B5EF4-FFF2-40B4-BE49-F238E27FC236}">
+                <a16:creationId xmlns:a16="http://schemas.microsoft.com/office/drawing/2014/main" id="{51A86B24-7AF9-47F5-849E-7031784D2AFF}"/>
+              </a:ext>
+            </a:extLst>
+          </p:cNvPr>
+          <p:cNvSpPr>
+            <a:spLocks noGrp="1"/>
+          </p:cNvSpPr>
+          <p:nvPr>
+            <p:ph type="sldNum" idx="12"/>
+          </p:nvPr>
+        </p:nvSpPr>
+        <p:spPr/>
+        <p:txBody>
+          <a:bodyPr/>
+          <a:lstStyle/>
+          <a:p>
+            <a:pPr marL="0" lvl="0" indent="0" algn="r" rtl="0">
+              <a:spcBef>
+                <a:spcPts val="0"/>
+              </a:spcBef>
+              <a:spcAft>
+                <a:spcPts val="0"/>
+              </a:spcAft>
+              <a:buNone/>
+            </a:pPr>
+            <a:fld id="{00000000-1234-1234-1234-123412341234}" type="slidenum">
+              <a:rPr lang="en" smtClean="0"/>
+              <a:t>36</a:t>
+            </a:fld>
+            <a:endParaRPr lang="en"/>
+          </a:p>
+        </p:txBody>
+      </p:sp>
+      <p:sp>
+        <p:nvSpPr>
+          <p:cNvPr id="3" name="Text Placeholder 2">
+            <a:extLst>
+              <a:ext uri="{FF2B5EF4-FFF2-40B4-BE49-F238E27FC236}">
+                <a16:creationId xmlns:a16="http://schemas.microsoft.com/office/drawing/2014/main" id="{0343A59F-DC58-4EE5-B8FA-833FF09BBE7A}"/>
+              </a:ext>
+            </a:extLst>
+          </p:cNvPr>
+          <p:cNvSpPr>
+            <a:spLocks noGrp="1"/>
+          </p:cNvSpPr>
+          <p:nvPr>
+            <p:ph type="body" idx="1"/>
+          </p:nvPr>
+        </p:nvSpPr>
+        <p:spPr/>
+        <p:txBody>
+          <a:bodyPr/>
+          <a:lstStyle/>
+          <a:p>
+            <a:r>
+              <a:rPr lang="en-US" dirty="0" err="1"/>
+              <a:t>Input.jsp</a:t>
+            </a:r>
+            <a:endParaRPr lang="en-ID" dirty="0"/>
+          </a:p>
+        </p:txBody>
+      </p:sp>
+      <p:sp>
+        <p:nvSpPr>
+          <p:cNvPr id="4" name="Text Placeholder 3">
+            <a:extLst>
+              <a:ext uri="{FF2B5EF4-FFF2-40B4-BE49-F238E27FC236}">
+                <a16:creationId xmlns:a16="http://schemas.microsoft.com/office/drawing/2014/main" id="{05321912-E744-456D-9E18-DC9EE3FE71E2}"/>
+              </a:ext>
+            </a:extLst>
+          </p:cNvPr>
+          <p:cNvSpPr>
+            <a:spLocks noGrp="1"/>
+          </p:cNvSpPr>
+          <p:nvPr>
+            <p:ph type="body" idx="13"/>
+          </p:nvPr>
+        </p:nvSpPr>
+        <p:spPr/>
+        <p:txBody>
+          <a:bodyPr/>
+          <a:lstStyle/>
+          <a:p>
+            <a:r>
+              <a:rPr lang="en-US" dirty="0" err="1"/>
+              <a:t>Output.jsp</a:t>
+            </a:r>
+            <a:endParaRPr lang="en-ID" dirty="0"/>
+          </a:p>
+        </p:txBody>
+      </p:sp>
+      <p:sp>
+        <p:nvSpPr>
+          <p:cNvPr id="5" name="Title 4">
+            <a:extLst>
+              <a:ext uri="{FF2B5EF4-FFF2-40B4-BE49-F238E27FC236}">
+                <a16:creationId xmlns:a16="http://schemas.microsoft.com/office/drawing/2014/main" id="{5580D0C5-C1E9-4F1D-97D3-531EFED9FABC}"/>
+              </a:ext>
+            </a:extLst>
+          </p:cNvPr>
+          <p:cNvSpPr>
+            <a:spLocks noGrp="1"/>
+          </p:cNvSpPr>
+          <p:nvPr>
+            <p:ph type="title"/>
+          </p:nvPr>
+        </p:nvSpPr>
+        <p:spPr/>
+        <p:txBody>
+          <a:bodyPr/>
+          <a:lstStyle/>
+          <a:p>
+            <a:r>
+              <a:rPr lang="en-US" dirty="0"/>
+              <a:t>Sample Request</a:t>
+            </a:r>
+            <a:endParaRPr lang="en-ID" dirty="0"/>
+          </a:p>
+        </p:txBody>
+      </p:sp>
+      <p:pic>
+        <p:nvPicPr>
+          <p:cNvPr id="6" name="Picture 5">
+            <a:extLst>
+              <a:ext uri="{FF2B5EF4-FFF2-40B4-BE49-F238E27FC236}">
+                <a16:creationId xmlns:a16="http://schemas.microsoft.com/office/drawing/2014/main" id="{78DC508C-4B0E-4F24-99AF-083C587D0BAD}"/>
+              </a:ext>
+            </a:extLst>
+          </p:cNvPr>
+          <p:cNvPicPr>
+            <a:picLocks noChangeAspect="1"/>
+          </p:cNvPicPr>
+          <p:nvPr/>
+        </p:nvPicPr>
+        <p:blipFill>
+          <a:blip r:embed="rId2"/>
+          <a:stretch>
+            <a:fillRect/>
+          </a:stretch>
+        </p:blipFill>
+        <p:spPr>
+          <a:xfrm>
+            <a:off x="4929721" y="1047750"/>
+            <a:ext cx="4016375" cy="2286000"/>
+          </a:xfrm>
+          <a:prstGeom prst="rect">
+            <a:avLst/>
+          </a:prstGeom>
+        </p:spPr>
+      </p:pic>
+      <p:pic>
+        <p:nvPicPr>
+          <p:cNvPr id="7" name="Picture 6">
+            <a:extLst>
+              <a:ext uri="{FF2B5EF4-FFF2-40B4-BE49-F238E27FC236}">
+                <a16:creationId xmlns:a16="http://schemas.microsoft.com/office/drawing/2014/main" id="{9F5E8341-E948-42BD-B789-99F4A52FBB65}"/>
+              </a:ext>
+            </a:extLst>
+          </p:cNvPr>
+          <p:cNvPicPr>
+            <a:picLocks noChangeAspect="1"/>
+          </p:cNvPicPr>
+          <p:nvPr/>
+        </p:nvPicPr>
+        <p:blipFill>
+          <a:blip r:embed="rId3"/>
+          <a:stretch>
+            <a:fillRect/>
+          </a:stretch>
+        </p:blipFill>
+        <p:spPr>
+          <a:xfrm>
+            <a:off x="628055" y="990600"/>
+            <a:ext cx="3714133" cy="2964164"/>
+          </a:xfrm>
+          <a:prstGeom prst="rect">
+            <a:avLst/>
+          </a:prstGeom>
+        </p:spPr>
+      </p:pic>
+    </p:spTree>
+    <p:extLst>
+      <p:ext uri="{BB962C8B-B14F-4D97-AF65-F5344CB8AC3E}">
+        <p14:creationId xmlns:p14="http://schemas.microsoft.com/office/powerpoint/2010/main" val="2196579111"/>
+      </p:ext>
+    </p:extLst>
+  </p:cSld>
+  <p:clrMapOvr>
+    <a:masterClrMapping/>
+  </p:clrMapOvr>
+</p:sld>
+</file>
+
+<file path=ppt/slides/slide37.xml><?xml version="1.0" encoding="utf-8"?>
+<p:sld xmlns:a="http://schemas.openxmlformats.org/drawingml/2006/main" xmlns:r="http://schemas.openxmlformats.org/officeDocument/2006/relationships" xmlns:p="http://schemas.openxmlformats.org/presentationml/2006/main">
+  <p:cSld>
+    <p:spTree>
+      <p:nvGrpSpPr>
+        <p:cNvPr id="1" name=""/>
+        <p:cNvGrpSpPr/>
+        <p:nvPr/>
+      </p:nvGrpSpPr>
+      <p:grpSpPr>
+        <a:xfrm>
+          <a:off x="0" y="0"/>
+          <a:ext cx="0" cy="0"/>
+          <a:chOff x="0" y="0"/>
+          <a:chExt cx="0" cy="0"/>
+        </a:xfrm>
+      </p:grpSpPr>
+      <p:sp>
+        <p:nvSpPr>
           <p:cNvPr id="4" name="Slide Number Placeholder 3">
             <a:extLst>
               <a:ext uri="{FF2B5EF4-FFF2-40B4-BE49-F238E27FC236}">
@@ -18179,7 +18784,7 @@
             </a:pPr>
             <a:fld id="{00000000-1234-1234-1234-123412341234}" type="slidenum">
               <a:rPr lang="en" smtClean="0"/>
-              <a:t>34</a:t>
+              <a:t>37</a:t>
             </a:fld>
             <a:endParaRPr lang="en"/>
           </a:p>
@@ -19322,7 +19927,7 @@
 </p:sld>
 </file>
 
-<file path=ppt/slides/slide35.xml><?xml version="1.0" encoding="utf-8"?>
+<file path=ppt/slides/slide38.xml><?xml version="1.0" encoding="utf-8"?>
 <p:sld xmlns:a="http://schemas.openxmlformats.org/drawingml/2006/main" xmlns:r="http://schemas.openxmlformats.org/officeDocument/2006/relationships" xmlns:p="http://schemas.openxmlformats.org/presentationml/2006/main">
   <p:cSld>
     <p:spTree>
@@ -19371,7 +19976,7 @@
             </a:pPr>
             <a:fld id="{00000000-1234-1234-1234-123412341234}" type="slidenum">
               <a:rPr lang="en" smtClean="0"/>
-              <a:t>35</a:t>
+              <a:t>38</a:t>
             </a:fld>
             <a:endParaRPr lang="en"/>
           </a:p>

</xml_diff>